<commit_message>
Update the long-haul networks figure (from Jeff Kantor)
</commit_message>
<xml_diff>
--- a/DMX2.pptx
+++ b/DMX2.pptx
@@ -107,6 +107,22 @@
       </a:defRPr>
     </a:lvl9pPr>
   </p:defaultTextStyle>
+  <p:extLst>
+    <p:ext uri="{EFAFB233-063F-42B5-8137-9DF3F51BA10A}">
+      <p15:sldGuideLst xmlns:p15="http://schemas.microsoft.com/office/powerpoint/2012/main" xmlns="">
+        <p15:guide id="1" orient="horz" pos="2304">
+          <p15:clr>
+            <a:srgbClr val="A4A3A4"/>
+          </p15:clr>
+        </p15:guide>
+        <p15:guide id="2" pos="3168">
+          <p15:clr>
+            <a:srgbClr val="A4A3A4"/>
+          </p15:clr>
+        </p15:guide>
+      </p15:sldGuideLst>
+    </p:ext>
+  </p:extLst>
 </p:presentation>
 </file>
 
@@ -192,7 +208,7 @@
           <a:p>
             <a:fld id="{37AED444-450F-684E-B2DA-E62F2440D795}" type="datetimeFigureOut">
               <a:rPr lang="en-US" smtClean="0"/>
-              <a:t>10/21/15</a:t>
+              <a:t>11/10/15</a:t>
             </a:fld>
             <a:endParaRPr lang="en-US"/>
           </a:p>
@@ -641,7 +657,7 @@
           <a:p>
             <a:fld id="{1BFBAC41-BFCB-2242-9D39-ABF0920C307E}" type="datetimeFigureOut">
               <a:rPr lang="en-US" smtClean="0"/>
-              <a:t>10/21/15</a:t>
+              <a:t>11/10/15</a:t>
             </a:fld>
             <a:endParaRPr lang="en-US"/>
           </a:p>
@@ -811,7 +827,7 @@
           <a:p>
             <a:fld id="{1BFBAC41-BFCB-2242-9D39-ABF0920C307E}" type="datetimeFigureOut">
               <a:rPr lang="en-US" smtClean="0"/>
-              <a:t>10/21/15</a:t>
+              <a:t>11/10/15</a:t>
             </a:fld>
             <a:endParaRPr lang="en-US"/>
           </a:p>
@@ -991,7 +1007,7 @@
           <a:p>
             <a:fld id="{1BFBAC41-BFCB-2242-9D39-ABF0920C307E}" type="datetimeFigureOut">
               <a:rPr lang="en-US" smtClean="0"/>
-              <a:t>10/21/15</a:t>
+              <a:t>11/10/15</a:t>
             </a:fld>
             <a:endParaRPr lang="en-US"/>
           </a:p>
@@ -1161,7 +1177,7 @@
           <a:p>
             <a:fld id="{1BFBAC41-BFCB-2242-9D39-ABF0920C307E}" type="datetimeFigureOut">
               <a:rPr lang="en-US" smtClean="0"/>
-              <a:t>10/21/15</a:t>
+              <a:t>11/10/15</a:t>
             </a:fld>
             <a:endParaRPr lang="en-US"/>
           </a:p>
@@ -1407,7 +1423,7 @@
           <a:p>
             <a:fld id="{1BFBAC41-BFCB-2242-9D39-ABF0920C307E}" type="datetimeFigureOut">
               <a:rPr lang="en-US" smtClean="0"/>
-              <a:t>10/21/15</a:t>
+              <a:t>11/10/15</a:t>
             </a:fld>
             <a:endParaRPr lang="en-US"/>
           </a:p>
@@ -1695,7 +1711,7 @@
           <a:p>
             <a:fld id="{1BFBAC41-BFCB-2242-9D39-ABF0920C307E}" type="datetimeFigureOut">
               <a:rPr lang="en-US" smtClean="0"/>
-              <a:t>10/21/15</a:t>
+              <a:t>11/10/15</a:t>
             </a:fld>
             <a:endParaRPr lang="en-US"/>
           </a:p>
@@ -2122,7 +2138,7 @@
           <a:p>
             <a:fld id="{1BFBAC41-BFCB-2242-9D39-ABF0920C307E}" type="datetimeFigureOut">
               <a:rPr lang="en-US" smtClean="0"/>
-              <a:t>10/21/15</a:t>
+              <a:t>11/10/15</a:t>
             </a:fld>
             <a:endParaRPr lang="en-US"/>
           </a:p>
@@ -2240,7 +2256,7 @@
           <a:p>
             <a:fld id="{1BFBAC41-BFCB-2242-9D39-ABF0920C307E}" type="datetimeFigureOut">
               <a:rPr lang="en-US" smtClean="0"/>
-              <a:t>10/21/15</a:t>
+              <a:t>11/10/15</a:t>
             </a:fld>
             <a:endParaRPr lang="en-US"/>
           </a:p>
@@ -2335,7 +2351,7 @@
           <a:p>
             <a:fld id="{1BFBAC41-BFCB-2242-9D39-ABF0920C307E}" type="datetimeFigureOut">
               <a:rPr lang="en-US" smtClean="0"/>
-              <a:t>10/21/15</a:t>
+              <a:t>11/10/15</a:t>
             </a:fld>
             <a:endParaRPr lang="en-US"/>
           </a:p>
@@ -2612,7 +2628,7 @@
           <a:p>
             <a:fld id="{1BFBAC41-BFCB-2242-9D39-ABF0920C307E}" type="datetimeFigureOut">
               <a:rPr lang="en-US" smtClean="0"/>
-              <a:t>10/21/15</a:t>
+              <a:t>11/10/15</a:t>
             </a:fld>
             <a:endParaRPr lang="en-US"/>
           </a:p>
@@ -2865,7 +2881,7 @@
           <a:p>
             <a:fld id="{1BFBAC41-BFCB-2242-9D39-ABF0920C307E}" type="datetimeFigureOut">
               <a:rPr lang="en-US" smtClean="0"/>
-              <a:t>10/21/15</a:t>
+              <a:t>11/10/15</a:t>
             </a:fld>
             <a:endParaRPr lang="en-US"/>
           </a:p>
@@ -3078,7 +3094,7 @@
           <a:p>
             <a:fld id="{1BFBAC41-BFCB-2242-9D39-ABF0920C307E}" type="datetimeFigureOut">
               <a:rPr lang="en-US" smtClean="0"/>
-              <a:t>10/21/15</a:t>
+              <a:t>11/10/15</a:t>
             </a:fld>
             <a:endParaRPr lang="en-US"/>
           </a:p>
@@ -3794,13 +3810,13 @@
         </p:nvSpPr>
         <p:spPr bwMode="auto">
           <a:xfrm>
-            <a:off x="6963170" y="3589837"/>
-            <a:ext cx="2838994" cy="1218958"/>
+            <a:off x="6963170" y="3240913"/>
+            <a:ext cx="2838994" cy="1782499"/>
           </a:xfrm>
           <a:prstGeom prst="wedgeRectCallout">
             <a:avLst>
-              <a:gd name="adj1" fmla="val -140965"/>
-              <a:gd name="adj2" fmla="val 58252"/>
+              <a:gd name="adj1" fmla="val -120988"/>
+              <a:gd name="adj2" fmla="val 22189"/>
             </a:avLst>
           </a:prstGeom>
           <a:solidFill>
@@ -3882,16 +3898,7 @@
                 </a:solidFill>
                 <a:latin typeface="Calibri"/>
               </a:rPr>
-              <a:t>100</a:t>
-            </a:r>
-            <a:r>
-              <a:rPr lang="en-US" sz="1200" dirty="0" smtClean="0">
-                <a:solidFill>
-                  <a:srgbClr val="1F497D"/>
-                </a:solidFill>
-                <a:latin typeface="Calibri"/>
-              </a:rPr>
-              <a:t> </a:t>
+              <a:t>100 </a:t>
             </a:r>
             <a:r>
               <a:rPr lang="en-US" sz="1200" dirty="0" err="1">
@@ -3909,7 +3916,84 @@
                 </a:solidFill>
                 <a:latin typeface="Calibri"/>
               </a:rPr>
-              <a:t> links from La Serena to Champaign, IL (existing fiber)</a:t>
+              <a:t> links </a:t>
+            </a:r>
+            <a:r>
+              <a:rPr lang="en-US" sz="1200" dirty="0" smtClean="0">
+                <a:solidFill>
+                  <a:srgbClr val="1F497D"/>
+                </a:solidFill>
+                <a:latin typeface="Calibri"/>
+              </a:rPr>
+              <a:t>from Santiago to Florida (existing </a:t>
+            </a:r>
+            <a:r>
+              <a:rPr lang="en-US" sz="1200" dirty="0">
+                <a:solidFill>
+                  <a:srgbClr val="1F497D"/>
+                </a:solidFill>
+                <a:latin typeface="Calibri"/>
+              </a:rPr>
+              <a:t>fiber</a:t>
+            </a:r>
+            <a:r>
+              <a:rPr lang="en-US" sz="1200" dirty="0" smtClean="0">
+                <a:solidFill>
+                  <a:srgbClr val="1F497D"/>
+                </a:solidFill>
+                <a:latin typeface="Calibri"/>
+              </a:rPr>
+              <a:t>)</a:t>
+            </a:r>
+          </a:p>
+          <a:p>
+            <a:pPr algn="r">
+              <a:lnSpc>
+                <a:spcPct val="90000"/>
+              </a:lnSpc>
+            </a:pPr>
+            <a:r>
+              <a:rPr lang="en-US" sz="1200" dirty="0" smtClean="0">
+                <a:solidFill>
+                  <a:srgbClr val="1F497D"/>
+                </a:solidFill>
+                <a:latin typeface="Calibri"/>
+              </a:rPr>
+              <a:t>Additional 100 </a:t>
+            </a:r>
+            <a:r>
+              <a:rPr lang="en-US" sz="1200" dirty="0" err="1" smtClean="0">
+                <a:solidFill>
+                  <a:srgbClr val="1F497D"/>
+                </a:solidFill>
+                <a:latin typeface="Calibri"/>
+              </a:rPr>
+              <a:t>Gbit</a:t>
+            </a:r>
+            <a:r>
+              <a:rPr lang="en-US" sz="1200" dirty="0" smtClean="0">
+                <a:solidFill>
+                  <a:srgbClr val="1F497D"/>
+                </a:solidFill>
+                <a:latin typeface="Calibri"/>
+              </a:rPr>
+              <a:t> link (spectrum on new fiber) from Santiago – Florida</a:t>
+            </a:r>
+          </a:p>
+          <a:p>
+            <a:pPr algn="r">
+              <a:lnSpc>
+                <a:spcPct val="90000"/>
+              </a:lnSpc>
+            </a:pPr>
+            <a:r>
+              <a:rPr lang="en-US" sz="1200" dirty="0" smtClean="0">
+                <a:solidFill>
+                  <a:srgbClr val="1F497D"/>
+                </a:solidFill>
+                <a:latin typeface="Calibri"/>
+              </a:rPr>
+              <a:t>(Chile and US national links not shown) </a:t>
             </a:r>
           </a:p>
         </p:txBody>
@@ -3956,10 +4040,10 @@
         </p:nvGrpSpPr>
         <p:grpSpPr>
           <a:xfrm>
-            <a:off x="3362914" y="3631294"/>
-            <a:ext cx="1345313" cy="3071437"/>
-            <a:chOff x="2274280" y="2778067"/>
-            <a:chExt cx="1345313" cy="3071437"/>
+            <a:off x="3198851" y="3312631"/>
+            <a:ext cx="2566083" cy="3461856"/>
+            <a:chOff x="2185548" y="2459404"/>
+            <a:chExt cx="1387746" cy="3461856"/>
           </a:xfrm>
         </p:grpSpPr>
         <p:sp>
@@ -3972,8 +4056,8 @@
           </p:nvSpPr>
           <p:spPr bwMode="auto">
             <a:xfrm rot="19721712" flipV="1">
-              <a:off x="2274280" y="3615236"/>
-              <a:ext cx="1049574" cy="2234268"/>
+              <a:off x="2185548" y="3600038"/>
+              <a:ext cx="707058" cy="2321222"/>
             </a:xfrm>
             <a:custGeom>
               <a:avLst/>
@@ -4003,66 +4087,122 @@
                 <a:gd name="T22" fmla="*/ 0 h 10000"/>
                 <a:gd name="T23" fmla="*/ 10000 w 10000"/>
                 <a:gd name="T24" fmla="*/ 10000 h 10000"/>
+                <a:gd name="connsiteX0" fmla="*/ 10000 w 10000"/>
+                <a:gd name="connsiteY0" fmla="*/ 9252 h 9252"/>
+                <a:gd name="connsiteX1" fmla="*/ 6181 w 10000"/>
+                <a:gd name="connsiteY1" fmla="*/ 8313 h 9252"/>
+                <a:gd name="connsiteX2" fmla="*/ 2573 w 10000"/>
+                <a:gd name="connsiteY2" fmla="*/ 6762 h 9252"/>
+                <a:gd name="connsiteX3" fmla="*/ 346 w 10000"/>
+                <a:gd name="connsiteY3" fmla="*/ 4789 h 9252"/>
+                <a:gd name="connsiteX4" fmla="*/ 239 w 10000"/>
+                <a:gd name="connsiteY4" fmla="*/ 2111 h 9252"/>
+                <a:gd name="connsiteX5" fmla="*/ 2573 w 10000"/>
+                <a:gd name="connsiteY5" fmla="*/ 185 h 9252"/>
+                <a:gd name="connsiteX6" fmla="*/ 3320 w 10000"/>
+                <a:gd name="connsiteY6" fmla="*/ 124 h 9252"/>
+                <a:gd name="connsiteX0" fmla="*/ 10360 w 10360"/>
+                <a:gd name="connsiteY0" fmla="*/ 9551 h 9551"/>
+                <a:gd name="connsiteX1" fmla="*/ 6181 w 10360"/>
+                <a:gd name="connsiteY1" fmla="*/ 8985 h 9551"/>
+                <a:gd name="connsiteX2" fmla="*/ 2573 w 10360"/>
+                <a:gd name="connsiteY2" fmla="*/ 7309 h 9551"/>
+                <a:gd name="connsiteX3" fmla="*/ 346 w 10360"/>
+                <a:gd name="connsiteY3" fmla="*/ 5176 h 9551"/>
+                <a:gd name="connsiteX4" fmla="*/ 239 w 10360"/>
+                <a:gd name="connsiteY4" fmla="*/ 2282 h 9551"/>
+                <a:gd name="connsiteX5" fmla="*/ 2573 w 10360"/>
+                <a:gd name="connsiteY5" fmla="*/ 200 h 9551"/>
+                <a:gd name="connsiteX6" fmla="*/ 3320 w 10360"/>
+                <a:gd name="connsiteY6" fmla="*/ 134 h 9551"/>
+                <a:gd name="connsiteX0" fmla="*/ 10000 w 10000"/>
+                <a:gd name="connsiteY0" fmla="*/ 10339 h 10339"/>
+                <a:gd name="connsiteX1" fmla="*/ 5966 w 10000"/>
+                <a:gd name="connsiteY1" fmla="*/ 9746 h 10339"/>
+                <a:gd name="connsiteX2" fmla="*/ 2484 w 10000"/>
+                <a:gd name="connsiteY2" fmla="*/ 7992 h 10339"/>
+                <a:gd name="connsiteX3" fmla="*/ 334 w 10000"/>
+                <a:gd name="connsiteY3" fmla="*/ 5758 h 10339"/>
+                <a:gd name="connsiteX4" fmla="*/ 231 w 10000"/>
+                <a:gd name="connsiteY4" fmla="*/ 2728 h 10339"/>
+                <a:gd name="connsiteX5" fmla="*/ 2484 w 10000"/>
+                <a:gd name="connsiteY5" fmla="*/ 548 h 10339"/>
+                <a:gd name="connsiteX6" fmla="*/ 3761 w 10000"/>
+                <a:gd name="connsiteY6" fmla="*/ 0 h 10339"/>
+                <a:gd name="connsiteX0" fmla="*/ 10559 w 10559"/>
+                <a:gd name="connsiteY0" fmla="*/ 10155 h 10155"/>
+                <a:gd name="connsiteX1" fmla="*/ 5966 w 10559"/>
+                <a:gd name="connsiteY1" fmla="*/ 9746 h 10155"/>
+                <a:gd name="connsiteX2" fmla="*/ 2484 w 10559"/>
+                <a:gd name="connsiteY2" fmla="*/ 7992 h 10155"/>
+                <a:gd name="connsiteX3" fmla="*/ 334 w 10559"/>
+                <a:gd name="connsiteY3" fmla="*/ 5758 h 10155"/>
+                <a:gd name="connsiteX4" fmla="*/ 231 w 10559"/>
+                <a:gd name="connsiteY4" fmla="*/ 2728 h 10155"/>
+                <a:gd name="connsiteX5" fmla="*/ 2484 w 10559"/>
+                <a:gd name="connsiteY5" fmla="*/ 548 h 10155"/>
+                <a:gd name="connsiteX6" fmla="*/ 3761 w 10559"/>
+                <a:gd name="connsiteY6" fmla="*/ 0 h 10155"/>
               </a:gdLst>
               <a:ahLst/>
               <a:cxnLst>
-                <a:cxn ang="T14">
-                  <a:pos x="T0" y="T1"/>
+                <a:cxn ang="0">
+                  <a:pos x="connsiteX0" y="connsiteY0"/>
                 </a:cxn>
-                <a:cxn ang="T15">
-                  <a:pos x="T2" y="T3"/>
+                <a:cxn ang="0">
+                  <a:pos x="connsiteX1" y="connsiteY1"/>
                 </a:cxn>
-                <a:cxn ang="T16">
-                  <a:pos x="T4" y="T5"/>
+                <a:cxn ang="0">
+                  <a:pos x="connsiteX2" y="connsiteY2"/>
                 </a:cxn>
-                <a:cxn ang="T17">
-                  <a:pos x="T6" y="T7"/>
+                <a:cxn ang="0">
+                  <a:pos x="connsiteX3" y="connsiteY3"/>
                 </a:cxn>
-                <a:cxn ang="T18">
-                  <a:pos x="T8" y="T9"/>
+                <a:cxn ang="0">
+                  <a:pos x="connsiteX4" y="connsiteY4"/>
                 </a:cxn>
-                <a:cxn ang="T19">
-                  <a:pos x="T10" y="T11"/>
+                <a:cxn ang="0">
+                  <a:pos x="connsiteX5" y="connsiteY5"/>
                 </a:cxn>
-                <a:cxn ang="T20">
-                  <a:pos x="T12" y="T13"/>
+                <a:cxn ang="0">
+                  <a:pos x="connsiteX6" y="connsiteY6"/>
                 </a:cxn>
               </a:cxnLst>
-              <a:rect l="T21" t="T22" r="T23" b="T24"/>
+              <a:rect l="l" t="t" r="r" b="b"/>
               <a:pathLst>
-                <a:path w="10000" h="10000">
+                <a:path w="10559" h="10155">
                   <a:moveTo>
-                    <a:pt x="10000" y="10000"/>
+                    <a:pt x="10559" y="10155"/>
                   </a:moveTo>
                   <a:cubicBezTo>
-                    <a:pt x="8703" y="9739"/>
-                    <a:pt x="7418" y="9478"/>
-                    <a:pt x="6181" y="9061"/>
+                    <a:pt x="9307" y="9860"/>
+                    <a:pt x="7312" y="10106"/>
+                    <a:pt x="5966" y="9746"/>
                   </a:cubicBezTo>
                   <a:cubicBezTo>
-                    <a:pt x="4943" y="8643"/>
-                    <a:pt x="3540" y="8095"/>
-                    <a:pt x="2573" y="7510"/>
+                    <a:pt x="4620" y="9386"/>
+                    <a:pt x="3417" y="8653"/>
+                    <a:pt x="2484" y="7992"/>
                   </a:cubicBezTo>
                   <a:cubicBezTo>
-                    <a:pt x="1607" y="6926"/>
-                    <a:pt x="734" y="6310"/>
-                    <a:pt x="346" y="5537"/>
+                    <a:pt x="1551" y="7330"/>
+                    <a:pt x="708" y="6634"/>
+                    <a:pt x="334" y="5758"/>
                   </a:cubicBezTo>
                   <a:cubicBezTo>
-                    <a:pt x="-44" y="4764"/>
-                    <a:pt x="-138" y="3627"/>
-                    <a:pt x="239" y="2859"/>
+                    <a:pt x="-42" y="4884"/>
+                    <a:pt x="-133" y="3597"/>
+                    <a:pt x="231" y="2728"/>
                   </a:cubicBezTo>
                   <a:cubicBezTo>
-                    <a:pt x="616" y="2092"/>
-                    <a:pt x="1795" y="1403"/>
-                    <a:pt x="2573" y="933"/>
+                    <a:pt x="595" y="1860"/>
+                    <a:pt x="1733" y="1080"/>
+                    <a:pt x="2484" y="548"/>
                   </a:cubicBezTo>
                   <a:cubicBezTo>
-                    <a:pt x="3352" y="464"/>
-                    <a:pt x="4636" y="188"/>
-                    <a:pt x="5119" y="0"/>
+                    <a:pt x="3236" y="18"/>
+                    <a:pt x="3294" y="213"/>
+                    <a:pt x="3761" y="0"/>
                   </a:cubicBezTo>
                 </a:path>
               </a:pathLst>
@@ -4113,9 +4253,9 @@
             <p:nvPr/>
           </p:nvSpPr>
           <p:spPr>
-            <a:xfrm rot="21286219">
-              <a:off x="2499335" y="2778067"/>
-              <a:ext cx="1120258" cy="2910847"/>
+            <a:xfrm rot="20510350">
+              <a:off x="2474674" y="2459404"/>
+              <a:ext cx="1098620" cy="3142644"/>
             </a:xfrm>
             <a:custGeom>
               <a:avLst/>
@@ -4134,6 +4274,196 @@
                 <a:gd name="connsiteY5" fmla="*/ 787400 h 2921000"/>
                 <a:gd name="connsiteX6" fmla="*/ 0 w 1454083"/>
                 <a:gd name="connsiteY6" fmla="*/ 0 h 2921000"/>
+                <a:gd name="connsiteX0" fmla="*/ 0 w 1547910"/>
+                <a:gd name="connsiteY0" fmla="*/ 3175142 h 3175142"/>
+                <a:gd name="connsiteX1" fmla="*/ 1296093 w 1547910"/>
+                <a:gd name="connsiteY1" fmla="*/ 2844800 h 3175142"/>
+                <a:gd name="connsiteX2" fmla="*/ 1499293 w 1547910"/>
+                <a:gd name="connsiteY2" fmla="*/ 2590800 h 3175142"/>
+                <a:gd name="connsiteX3" fmla="*/ 1541627 w 1547910"/>
+                <a:gd name="connsiteY3" fmla="*/ 2116667 h 3175142"/>
+                <a:gd name="connsiteX4" fmla="*/ 1397693 w 1547910"/>
+                <a:gd name="connsiteY4" fmla="*/ 1701800 h 3175142"/>
+                <a:gd name="connsiteX5" fmla="*/ 483293 w 1547910"/>
+                <a:gd name="connsiteY5" fmla="*/ 787400 h 3175142"/>
+                <a:gd name="connsiteX6" fmla="*/ 93827 w 1547910"/>
+                <a:gd name="connsiteY6" fmla="*/ 0 h 3175142"/>
+                <a:gd name="connsiteX0" fmla="*/ 0 w 1573126"/>
+                <a:gd name="connsiteY0" fmla="*/ 3175142 h 3175142"/>
+                <a:gd name="connsiteX1" fmla="*/ 805172 w 1573126"/>
+                <a:gd name="connsiteY1" fmla="*/ 2991914 h 3175142"/>
+                <a:gd name="connsiteX2" fmla="*/ 1499293 w 1573126"/>
+                <a:gd name="connsiteY2" fmla="*/ 2590800 h 3175142"/>
+                <a:gd name="connsiteX3" fmla="*/ 1541627 w 1573126"/>
+                <a:gd name="connsiteY3" fmla="*/ 2116667 h 3175142"/>
+                <a:gd name="connsiteX4" fmla="*/ 1397693 w 1573126"/>
+                <a:gd name="connsiteY4" fmla="*/ 1701800 h 3175142"/>
+                <a:gd name="connsiteX5" fmla="*/ 483293 w 1573126"/>
+                <a:gd name="connsiteY5" fmla="*/ 787400 h 3175142"/>
+                <a:gd name="connsiteX6" fmla="*/ 93827 w 1573126"/>
+                <a:gd name="connsiteY6" fmla="*/ 0 h 3175142"/>
+                <a:gd name="connsiteX0" fmla="*/ 0 w 1562961"/>
+                <a:gd name="connsiteY0" fmla="*/ 3175142 h 3175142"/>
+                <a:gd name="connsiteX1" fmla="*/ 805172 w 1562961"/>
+                <a:gd name="connsiteY1" fmla="*/ 2991914 h 3175142"/>
+                <a:gd name="connsiteX2" fmla="*/ 1138081 w 1562961"/>
+                <a:gd name="connsiteY2" fmla="*/ 2472291 h 3175142"/>
+                <a:gd name="connsiteX3" fmla="*/ 1541627 w 1562961"/>
+                <a:gd name="connsiteY3" fmla="*/ 2116667 h 3175142"/>
+                <a:gd name="connsiteX4" fmla="*/ 1397693 w 1562961"/>
+                <a:gd name="connsiteY4" fmla="*/ 1701800 h 3175142"/>
+                <a:gd name="connsiteX5" fmla="*/ 483293 w 1562961"/>
+                <a:gd name="connsiteY5" fmla="*/ 787400 h 3175142"/>
+                <a:gd name="connsiteX6" fmla="*/ 93827 w 1562961"/>
+                <a:gd name="connsiteY6" fmla="*/ 0 h 3175142"/>
+                <a:gd name="connsiteX0" fmla="*/ 0 w 1414819"/>
+                <a:gd name="connsiteY0" fmla="*/ 3175142 h 3175142"/>
+                <a:gd name="connsiteX1" fmla="*/ 805172 w 1414819"/>
+                <a:gd name="connsiteY1" fmla="*/ 2991914 h 3175142"/>
+                <a:gd name="connsiteX2" fmla="*/ 1138081 w 1414819"/>
+                <a:gd name="connsiteY2" fmla="*/ 2472291 h 3175142"/>
+                <a:gd name="connsiteX3" fmla="*/ 1084399 w 1414819"/>
+                <a:gd name="connsiteY3" fmla="*/ 2096701 h 3175142"/>
+                <a:gd name="connsiteX4" fmla="*/ 1397693 w 1414819"/>
+                <a:gd name="connsiteY4" fmla="*/ 1701800 h 3175142"/>
+                <a:gd name="connsiteX5" fmla="*/ 483293 w 1414819"/>
+                <a:gd name="connsiteY5" fmla="*/ 787400 h 3175142"/>
+                <a:gd name="connsiteX6" fmla="*/ 93827 w 1414819"/>
+                <a:gd name="connsiteY6" fmla="*/ 0 h 3175142"/>
+                <a:gd name="connsiteX0" fmla="*/ 0 w 1158775"/>
+                <a:gd name="connsiteY0" fmla="*/ 3175142 h 3175142"/>
+                <a:gd name="connsiteX1" fmla="*/ 805172 w 1158775"/>
+                <a:gd name="connsiteY1" fmla="*/ 2991914 h 3175142"/>
+                <a:gd name="connsiteX2" fmla="*/ 1138081 w 1158775"/>
+                <a:gd name="connsiteY2" fmla="*/ 2472291 h 3175142"/>
+                <a:gd name="connsiteX3" fmla="*/ 1084399 w 1158775"/>
+                <a:gd name="connsiteY3" fmla="*/ 2096701 h 3175142"/>
+                <a:gd name="connsiteX4" fmla="*/ 765070 w 1158775"/>
+                <a:gd name="connsiteY4" fmla="*/ 1280889 h 3175142"/>
+                <a:gd name="connsiteX5" fmla="*/ 483293 w 1158775"/>
+                <a:gd name="connsiteY5" fmla="*/ 787400 h 3175142"/>
+                <a:gd name="connsiteX6" fmla="*/ 93827 w 1158775"/>
+                <a:gd name="connsiteY6" fmla="*/ 0 h 3175142"/>
+                <a:gd name="connsiteX0" fmla="*/ 0 w 1144729"/>
+                <a:gd name="connsiteY0" fmla="*/ 3175142 h 3175142"/>
+                <a:gd name="connsiteX1" fmla="*/ 805172 w 1144729"/>
+                <a:gd name="connsiteY1" fmla="*/ 2991914 h 3175142"/>
+                <a:gd name="connsiteX2" fmla="*/ 1119910 w 1144729"/>
+                <a:gd name="connsiteY2" fmla="*/ 2419595 h 3175142"/>
+                <a:gd name="connsiteX3" fmla="*/ 1084399 w 1144729"/>
+                <a:gd name="connsiteY3" fmla="*/ 2096701 h 3175142"/>
+                <a:gd name="connsiteX4" fmla="*/ 765070 w 1144729"/>
+                <a:gd name="connsiteY4" fmla="*/ 1280889 h 3175142"/>
+                <a:gd name="connsiteX5" fmla="*/ 483293 w 1144729"/>
+                <a:gd name="connsiteY5" fmla="*/ 787400 h 3175142"/>
+                <a:gd name="connsiteX6" fmla="*/ 93827 w 1144729"/>
+                <a:gd name="connsiteY6" fmla="*/ 0 h 3175142"/>
+                <a:gd name="connsiteX0" fmla="*/ 0 w 1111273"/>
+                <a:gd name="connsiteY0" fmla="*/ 3175142 h 3175142"/>
+                <a:gd name="connsiteX1" fmla="*/ 805172 w 1111273"/>
+                <a:gd name="connsiteY1" fmla="*/ 2991914 h 3175142"/>
+                <a:gd name="connsiteX2" fmla="*/ 1061829 w 1111273"/>
+                <a:gd name="connsiteY2" fmla="*/ 2448628 h 3175142"/>
+                <a:gd name="connsiteX3" fmla="*/ 1084399 w 1111273"/>
+                <a:gd name="connsiteY3" fmla="*/ 2096701 h 3175142"/>
+                <a:gd name="connsiteX4" fmla="*/ 765070 w 1111273"/>
+                <a:gd name="connsiteY4" fmla="*/ 1280889 h 3175142"/>
+                <a:gd name="connsiteX5" fmla="*/ 483293 w 1111273"/>
+                <a:gd name="connsiteY5" fmla="*/ 787400 h 3175142"/>
+                <a:gd name="connsiteX6" fmla="*/ 93827 w 1111273"/>
+                <a:gd name="connsiteY6" fmla="*/ 0 h 3175142"/>
+                <a:gd name="connsiteX0" fmla="*/ 0 w 1112873"/>
+                <a:gd name="connsiteY0" fmla="*/ 3175142 h 3175142"/>
+                <a:gd name="connsiteX1" fmla="*/ 770806 w 1112873"/>
+                <a:gd name="connsiteY1" fmla="*/ 2874300 h 3175142"/>
+                <a:gd name="connsiteX2" fmla="*/ 1061829 w 1112873"/>
+                <a:gd name="connsiteY2" fmla="*/ 2448628 h 3175142"/>
+                <a:gd name="connsiteX3" fmla="*/ 1084399 w 1112873"/>
+                <a:gd name="connsiteY3" fmla="*/ 2096701 h 3175142"/>
+                <a:gd name="connsiteX4" fmla="*/ 765070 w 1112873"/>
+                <a:gd name="connsiteY4" fmla="*/ 1280889 h 3175142"/>
+                <a:gd name="connsiteX5" fmla="*/ 483293 w 1112873"/>
+                <a:gd name="connsiteY5" fmla="*/ 787400 h 3175142"/>
+                <a:gd name="connsiteX6" fmla="*/ 93827 w 1112873"/>
+                <a:gd name="connsiteY6" fmla="*/ 0 h 3175142"/>
+                <a:gd name="connsiteX0" fmla="*/ 0 w 1112873"/>
+                <a:gd name="connsiteY0" fmla="*/ 2696283 h 2696283"/>
+                <a:gd name="connsiteX1" fmla="*/ 770806 w 1112873"/>
+                <a:gd name="connsiteY1" fmla="*/ 2395441 h 2696283"/>
+                <a:gd name="connsiteX2" fmla="*/ 1061829 w 1112873"/>
+                <a:gd name="connsiteY2" fmla="*/ 1969769 h 2696283"/>
+                <a:gd name="connsiteX3" fmla="*/ 1084399 w 1112873"/>
+                <a:gd name="connsiteY3" fmla="*/ 1617842 h 2696283"/>
+                <a:gd name="connsiteX4" fmla="*/ 765070 w 1112873"/>
+                <a:gd name="connsiteY4" fmla="*/ 802030 h 2696283"/>
+                <a:gd name="connsiteX5" fmla="*/ 483293 w 1112873"/>
+                <a:gd name="connsiteY5" fmla="*/ 308541 h 2696283"/>
+                <a:gd name="connsiteX6" fmla="*/ 203236 w 1112873"/>
+                <a:gd name="connsiteY6" fmla="*/ 0 h 2696283"/>
+                <a:gd name="connsiteX0" fmla="*/ 0 w 1112873"/>
+                <a:gd name="connsiteY0" fmla="*/ 2715598 h 2715598"/>
+                <a:gd name="connsiteX1" fmla="*/ 770806 w 1112873"/>
+                <a:gd name="connsiteY1" fmla="*/ 2414756 h 2715598"/>
+                <a:gd name="connsiteX2" fmla="*/ 1061829 w 1112873"/>
+                <a:gd name="connsiteY2" fmla="*/ 1989084 h 2715598"/>
+                <a:gd name="connsiteX3" fmla="*/ 1084399 w 1112873"/>
+                <a:gd name="connsiteY3" fmla="*/ 1637157 h 2715598"/>
+                <a:gd name="connsiteX4" fmla="*/ 765070 w 1112873"/>
+                <a:gd name="connsiteY4" fmla="*/ 821345 h 2715598"/>
+                <a:gd name="connsiteX5" fmla="*/ 483293 w 1112873"/>
+                <a:gd name="connsiteY5" fmla="*/ 327856 h 2715598"/>
+                <a:gd name="connsiteX6" fmla="*/ 203236 w 1112873"/>
+                <a:gd name="connsiteY6" fmla="*/ 19315 h 2715598"/>
+                <a:gd name="connsiteX7" fmla="*/ 205371 w 1112873"/>
+                <a:gd name="connsiteY7" fmla="*/ 32842 h 2715598"/>
+                <a:gd name="connsiteX0" fmla="*/ 0 w 1112873"/>
+                <a:gd name="connsiteY0" fmla="*/ 2918406 h 2918406"/>
+                <a:gd name="connsiteX1" fmla="*/ 770806 w 1112873"/>
+                <a:gd name="connsiteY1" fmla="*/ 2617564 h 2918406"/>
+                <a:gd name="connsiteX2" fmla="*/ 1061829 w 1112873"/>
+                <a:gd name="connsiteY2" fmla="*/ 2191892 h 2918406"/>
+                <a:gd name="connsiteX3" fmla="*/ 1084399 w 1112873"/>
+                <a:gd name="connsiteY3" fmla="*/ 1839965 h 2918406"/>
+                <a:gd name="connsiteX4" fmla="*/ 765070 w 1112873"/>
+                <a:gd name="connsiteY4" fmla="*/ 1024153 h 2918406"/>
+                <a:gd name="connsiteX5" fmla="*/ 483293 w 1112873"/>
+                <a:gd name="connsiteY5" fmla="*/ 530664 h 2918406"/>
+                <a:gd name="connsiteX6" fmla="*/ 203236 w 1112873"/>
+                <a:gd name="connsiteY6" fmla="*/ 222123 h 2918406"/>
+                <a:gd name="connsiteX7" fmla="*/ 176742 w 1112873"/>
+                <a:gd name="connsiteY7" fmla="*/ 33 h 2918406"/>
+                <a:gd name="connsiteX0" fmla="*/ 0 w 1112873"/>
+                <a:gd name="connsiteY0" fmla="*/ 3040793 h 3040793"/>
+                <a:gd name="connsiteX1" fmla="*/ 770806 w 1112873"/>
+                <a:gd name="connsiteY1" fmla="*/ 2739951 h 3040793"/>
+                <a:gd name="connsiteX2" fmla="*/ 1061829 w 1112873"/>
+                <a:gd name="connsiteY2" fmla="*/ 2314279 h 3040793"/>
+                <a:gd name="connsiteX3" fmla="*/ 1084399 w 1112873"/>
+                <a:gd name="connsiteY3" fmla="*/ 1962352 h 3040793"/>
+                <a:gd name="connsiteX4" fmla="*/ 765070 w 1112873"/>
+                <a:gd name="connsiteY4" fmla="*/ 1146540 h 3040793"/>
+                <a:gd name="connsiteX5" fmla="*/ 483293 w 1112873"/>
+                <a:gd name="connsiteY5" fmla="*/ 653051 h 3040793"/>
+                <a:gd name="connsiteX6" fmla="*/ 203236 w 1112873"/>
+                <a:gd name="connsiteY6" fmla="*/ 344510 h 3040793"/>
+                <a:gd name="connsiteX7" fmla="*/ 216557 w 1112873"/>
+                <a:gd name="connsiteY7" fmla="*/ 19 h 3040793"/>
+                <a:gd name="connsiteX0" fmla="*/ 0 w 1112873"/>
+                <a:gd name="connsiteY0" fmla="*/ 3491970 h 3491970"/>
+                <a:gd name="connsiteX1" fmla="*/ 770806 w 1112873"/>
+                <a:gd name="connsiteY1" fmla="*/ 3191128 h 3491970"/>
+                <a:gd name="connsiteX2" fmla="*/ 1061829 w 1112873"/>
+                <a:gd name="connsiteY2" fmla="*/ 2765456 h 3491970"/>
+                <a:gd name="connsiteX3" fmla="*/ 1084399 w 1112873"/>
+                <a:gd name="connsiteY3" fmla="*/ 2413529 h 3491970"/>
+                <a:gd name="connsiteX4" fmla="*/ 765070 w 1112873"/>
+                <a:gd name="connsiteY4" fmla="*/ 1597717 h 3491970"/>
+                <a:gd name="connsiteX5" fmla="*/ 483293 w 1112873"/>
+                <a:gd name="connsiteY5" fmla="*/ 1104228 h 3491970"/>
+                <a:gd name="connsiteX6" fmla="*/ 203236 w 1112873"/>
+                <a:gd name="connsiteY6" fmla="*/ 795687 h 3491970"/>
+                <a:gd name="connsiteX7" fmla="*/ 189426 w 1112873"/>
+                <a:gd name="connsiteY7" fmla="*/ 6 h 3491970"/>
               </a:gdLst>
               <a:ahLst/>
               <a:cxnLst>
@@ -4158,42 +4488,50 @@
                 <a:cxn ang="0">
                   <a:pos x="connsiteX6" y="connsiteY6"/>
                 </a:cxn>
+                <a:cxn ang="0">
+                  <a:pos x="connsiteX7" y="connsiteY7"/>
+                </a:cxn>
               </a:cxnLst>
               <a:rect l="l" t="t" r="r" b="b"/>
               <a:pathLst>
-                <a:path w="1454083" h="2921000">
+                <a:path w="1112873" h="3491970">
                   <a:moveTo>
-                    <a:pt x="948266" y="2921000"/>
+                    <a:pt x="0" y="3491970"/>
                   </a:moveTo>
                   <a:cubicBezTo>
-                    <a:pt x="1037166" y="2910416"/>
-                    <a:pt x="1126066" y="2899833"/>
-                    <a:pt x="1202266" y="2844800"/>
+                    <a:pt x="88900" y="3481386"/>
+                    <a:pt x="593834" y="3312214"/>
+                    <a:pt x="770806" y="3191128"/>
                   </a:cubicBezTo>
                   <a:cubicBezTo>
-                    <a:pt x="1278466" y="2789767"/>
-                    <a:pt x="1364544" y="2712155"/>
-                    <a:pt x="1405466" y="2590800"/>
+                    <a:pt x="947778" y="3070042"/>
+                    <a:pt x="1009564" y="2895056"/>
+                    <a:pt x="1061829" y="2765456"/>
                   </a:cubicBezTo>
                   <a:cubicBezTo>
-                    <a:pt x="1446388" y="2469445"/>
-                    <a:pt x="1464733" y="2264834"/>
-                    <a:pt x="1447800" y="2116667"/>
+                    <a:pt x="1114094" y="2635856"/>
+                    <a:pt x="1133859" y="2608152"/>
+                    <a:pt x="1084399" y="2413529"/>
                   </a:cubicBezTo>
                   <a:cubicBezTo>
-                    <a:pt x="1430867" y="1968500"/>
-                    <a:pt x="1480255" y="1923344"/>
-                    <a:pt x="1303866" y="1701800"/>
+                    <a:pt x="1034939" y="2218906"/>
+                    <a:pt x="865254" y="1815934"/>
+                    <a:pt x="765070" y="1597717"/>
                   </a:cubicBezTo>
                   <a:cubicBezTo>
-                    <a:pt x="1127477" y="1480256"/>
-                    <a:pt x="606777" y="1071033"/>
-                    <a:pt x="389466" y="787400"/>
+                    <a:pt x="664886" y="1379500"/>
+                    <a:pt x="700604" y="1387861"/>
+                    <a:pt x="483293" y="1104228"/>
                   </a:cubicBezTo>
                   <a:cubicBezTo>
-                    <a:pt x="172155" y="503767"/>
-                    <a:pt x="0" y="0"/>
-                    <a:pt x="0" y="0"/>
+                    <a:pt x="265982" y="820595"/>
+                    <a:pt x="203236" y="795687"/>
+                    <a:pt x="203236" y="795687"/>
+                  </a:cubicBezTo>
+                  <a:cubicBezTo>
+                    <a:pt x="156916" y="746518"/>
+                    <a:pt x="188981" y="-2812"/>
+                    <a:pt x="189426" y="6"/>
                   </a:cubicBezTo>
                 </a:path>
               </a:pathLst>
@@ -4378,16 +4716,7 @@
                 </a:solidFill>
                 <a:latin typeface="Calibri"/>
               </a:rPr>
-              <a:t>Data Release Production (50%</a:t>
-            </a:r>
-            <a:r>
-              <a:rPr lang="en-US" sz="1000" dirty="0">
-                <a:solidFill>
-                  <a:srgbClr val="1F497D"/>
-                </a:solidFill>
-                <a:latin typeface="Calibri"/>
-              </a:rPr>
-              <a:t>)</a:t>
+              <a:t>Data Release Production (50%)</a:t>
             </a:r>
           </a:p>
           <a:p>
@@ -4405,12 +4734,6 @@
               </a:rPr>
               <a:t>French DAC</a:t>
             </a:r>
-            <a:endParaRPr lang="en-US" sz="1000" dirty="0">
-              <a:solidFill>
-                <a:srgbClr val="1F497D"/>
-              </a:solidFill>
-              <a:latin typeface="Calibri"/>
-            </a:endParaRPr>
           </a:p>
         </p:txBody>
       </p:sp>

</xml_diff>